<commit_message>
fixed links, added text
</commit_message>
<xml_diff>
--- a/Build-On-6.pptx
+++ b/Build-On-6.pptx
@@ -209,7 +209,7 @@
           <a:p>
             <a:fld id="{0848BC6B-9879-4A5D-9ADD-7A7EC6F9DCFC}" type="datetimeFigureOut">
               <a:rPr lang="en-US" smtClean="0"/>
-              <a:t>4/22/2021</a:t>
+              <a:t>4/23/2021</a:t>
             </a:fld>
             <a:endParaRPr lang="en-US"/>
           </a:p>
@@ -623,7 +623,7 @@
           <a:p>
             <a:fld id="{743C5819-F2F0-4635-8846-E0D7F1235C4A}" type="datetime1">
               <a:rPr lang="en-US" smtClean="0"/>
-              <a:t>4/22/2021</a:t>
+              <a:t>4/23/2021</a:t>
             </a:fld>
             <a:endParaRPr lang="en-US"/>
           </a:p>
@@ -821,7 +821,7 @@
           <a:p>
             <a:fld id="{F9B384AA-5F95-4C33-968F-4281EE1C5D31}" type="datetime1">
               <a:rPr lang="en-US" smtClean="0"/>
-              <a:t>4/22/2021</a:t>
+              <a:t>4/23/2021</a:t>
             </a:fld>
             <a:endParaRPr lang="en-US"/>
           </a:p>
@@ -1029,7 +1029,7 @@
           <a:p>
             <a:fld id="{598AD886-C01A-47D5-80DD-8DE49FB67408}" type="datetime1">
               <a:rPr lang="en-US" smtClean="0"/>
-              <a:t>4/22/2021</a:t>
+              <a:t>4/23/2021</a:t>
             </a:fld>
             <a:endParaRPr lang="en-US"/>
           </a:p>
@@ -1227,7 +1227,7 @@
           <a:p>
             <a:fld id="{8D903533-41AC-45E1-9689-7E372F906C46}" type="datetime1">
               <a:rPr lang="en-US" smtClean="0"/>
-              <a:t>4/22/2021</a:t>
+              <a:t>4/23/2021</a:t>
             </a:fld>
             <a:endParaRPr lang="en-US"/>
           </a:p>
@@ -1507,7 +1507,7 @@
           <a:p>
             <a:fld id="{D64A9379-CA54-45F7-9973-2CA70E9FE0DA}" type="datetime1">
               <a:rPr lang="en-US" smtClean="0"/>
-              <a:t>4/22/2021</a:t>
+              <a:t>4/23/2021</a:t>
             </a:fld>
             <a:endParaRPr lang="en-US"/>
           </a:p>
@@ -1772,7 +1772,7 @@
           <a:p>
             <a:fld id="{F20E10C4-1FFF-436D-9146-BCABA5CCABDC}" type="datetime1">
               <a:rPr lang="en-US" smtClean="0"/>
-              <a:t>4/22/2021</a:t>
+              <a:t>4/23/2021</a:t>
             </a:fld>
             <a:endParaRPr lang="en-US"/>
           </a:p>
@@ -2184,7 +2184,7 @@
           <a:p>
             <a:fld id="{870AAD3C-0B7E-40D5-B7E8-235ABB682731}" type="datetime1">
               <a:rPr lang="en-US" smtClean="0"/>
-              <a:t>4/22/2021</a:t>
+              <a:t>4/23/2021</a:t>
             </a:fld>
             <a:endParaRPr lang="en-US"/>
           </a:p>
@@ -2325,7 +2325,7 @@
           <a:p>
             <a:fld id="{715EE6D3-C8C1-4419-90ED-DDD01668DDC0}" type="datetime1">
               <a:rPr lang="en-US" smtClean="0"/>
-              <a:t>4/22/2021</a:t>
+              <a:t>4/23/2021</a:t>
             </a:fld>
             <a:endParaRPr lang="en-US"/>
           </a:p>
@@ -2438,7 +2438,7 @@
           <a:p>
             <a:fld id="{38FB8FDC-B18A-4FED-99B0-72D3BD16FACD}" type="datetime1">
               <a:rPr lang="en-US" smtClean="0"/>
-              <a:t>4/22/2021</a:t>
+              <a:t>4/23/2021</a:t>
             </a:fld>
             <a:endParaRPr lang="en-US"/>
           </a:p>
@@ -2749,7 +2749,7 @@
           <a:p>
             <a:fld id="{CE06BDA3-8907-4DB2-BA4F-01F17DDA4A7B}" type="datetime1">
               <a:rPr lang="en-US" smtClean="0"/>
-              <a:t>4/22/2021</a:t>
+              <a:t>4/23/2021</a:t>
             </a:fld>
             <a:endParaRPr lang="en-US"/>
           </a:p>
@@ -3037,7 +3037,7 @@
           <a:p>
             <a:fld id="{E0CFAD89-B4BD-4F37-9D8A-960352BCDA8C}" type="datetime1">
               <a:rPr lang="en-US" smtClean="0"/>
-              <a:t>4/22/2021</a:t>
+              <a:t>4/23/2021</a:t>
             </a:fld>
             <a:endParaRPr lang="en-US"/>
           </a:p>
@@ -3278,7 +3278,7 @@
           <a:p>
             <a:fld id="{216CC113-4E9F-451A-BC11-83685A596D60}" type="datetime1">
               <a:rPr lang="en-US" smtClean="0"/>
-              <a:t>4/22/2021</a:t>
+              <a:t>4/23/2021</a:t>
             </a:fld>
             <a:endParaRPr lang="en-US"/>
           </a:p>
@@ -5294,7 +5294,7 @@
             </a:r>
             <a:r>
               <a:rPr lang="en-US" dirty="0"/>
-              <a:t> Session #5 Topics</a:t>
+              <a:t> Session #6 Topics</a:t>
             </a:r>
           </a:p>
         </p:txBody>
@@ -5327,15 +5327,7 @@
           <a:p>
             <a:r>
               <a:rPr lang="en-US" dirty="0"/>
-              <a:t>Focus: </a:t>
-            </a:r>
-            <a:r>
-              <a:rPr lang="en-US" dirty="0" err="1"/>
-              <a:t>CmdlnParser</a:t>
-            </a:r>
-            <a:r>
-              <a:rPr lang="en-US" dirty="0"/>
-              <a:t> &amp; Exec Packages</a:t>
+              <a:t>Focus: Integration of parts</a:t>
             </a:r>
           </a:p>
         </p:txBody>
@@ -5405,8 +5397,14 @@
           </a:p>
           <a:p>
             <a:r>
+              <a:rPr lang="en-US" sz="2000" dirty="0">
+                <a:hlinkClick r:id="rId3"/>
+              </a:rPr>
+              <a:t>Step #5</a:t>
+            </a:r>
+            <a:r>
               <a:rPr lang="en-US" sz="2000" dirty="0"/>
-              <a:t>Step #5 – Add </a:t>
+              <a:t> – Add </a:t>
             </a:r>
             <a:r>
               <a:rPr lang="en-US" sz="2000" dirty="0" err="1"/>
@@ -5437,26 +5435,6 @@
             <a:r>
               <a:rPr lang="en-US" sz="1800" dirty="0"/>
               <a:t>May wish to handle both list of successes and list of failures</a:t>
-            </a:r>
-          </a:p>
-          <a:p>
-            <a:r>
-              <a:rPr lang="en-US" sz="2000" dirty="0" err="1">
-                <a:hlinkClick r:id="rId3"/>
-              </a:rPr>
-              <a:t>BuildOn</a:t>
-            </a:r>
-            <a:r>
-              <a:rPr lang="en-US" sz="2000" dirty="0"/>
-              <a:t> – click on </a:t>
-            </a:r>
-            <a:r>
-              <a:rPr lang="en-US" sz="2000" dirty="0" err="1"/>
-              <a:t>BuildOn</a:t>
-            </a:r>
-            <a:r>
-              <a:rPr lang="en-US" sz="2000" dirty="0"/>
-              <a:t> code</a:t>
             </a:r>
           </a:p>
           <a:p>
@@ -5464,8 +5442,25 @@
               <a:rPr lang="en-US" sz="2000" dirty="0" err="1">
                 <a:hlinkClick r:id="rId4"/>
               </a:rPr>
-              <a:t>RegEx</a:t>
-            </a:r>
+              <a:t>BuildOn</a:t>
+            </a:r>
+            <a:r>
+              <a:rPr lang="en-US" sz="2000" dirty="0"/>
+              <a:t> – click on </a:t>
+            </a:r>
+            <a:r>
+              <a:rPr lang="en-US" sz="2000" dirty="0" err="1"/>
+              <a:t>BuildOn</a:t>
+            </a:r>
+            <a:r>
+              <a:rPr lang="en-US" sz="2000" dirty="0"/>
+              <a:t> code</a:t>
+            </a:r>
+          </a:p>
+          <a:p>
+            <a:pPr marL="0" indent="0">
+              <a:buNone/>
+            </a:pPr>
             <a:endParaRPr lang="en-US" sz="2000" dirty="0">
               <a:hlinkClick r:id="rId5"/>
             </a:endParaRPr>
@@ -5478,14 +5473,6 @@
               <a:hlinkClick r:id="rId6"/>
             </a:endParaRPr>
           </a:p>
-          <a:p>
-            <a:pPr marL="0" indent="0">
-              <a:buNone/>
-            </a:pPr>
-            <a:endParaRPr lang="en-US" sz="2000" dirty="0">
-              <a:hlinkClick r:id="rId7"/>
-            </a:endParaRPr>
-          </a:p>
         </p:txBody>
       </p:sp>
       <p:sp>
@@ -5516,13 +5503,16 @@
           <a:p>
             <a:r>
               <a:rPr lang="en-US" dirty="0"/>
-              <a:t>Focus: Macros &amp; Debugging in </a:t>
+              <a:t>Focus: </a:t>
             </a:r>
             <a:r>
               <a:rPr lang="en-US" dirty="0" err="1"/>
-              <a:t>VSCode</a:t>
-            </a:r>
-            <a:endParaRPr lang="en-US" dirty="0"/>
+              <a:t>RegEx</a:t>
+            </a:r>
+            <a:r>
+              <a:rPr lang="en-US" dirty="0"/>
+              <a:t> &amp; Threads</a:t>
+            </a:r>
           </a:p>
         </p:txBody>
       </p:sp>
@@ -5570,31 +5560,42 @@
           <a:lstStyle/>
           <a:p>
             <a:r>
-              <a:rPr lang="en-US" sz="2000" dirty="0">
-                <a:hlinkClick r:id="rId8"/>
+              <a:rPr lang="en-US" sz="2000" dirty="0" err="1">
+                <a:hlinkClick r:id="rId7"/>
               </a:rPr>
-              <a:t>Threads</a:t>
-            </a:r>
-            <a:endParaRPr lang="en-US" sz="2000" dirty="0"/>
+              <a:t>RegEx</a:t>
+            </a:r>
+            <a:endParaRPr lang="en-US" sz="2000" dirty="0">
+              <a:hlinkClick r:id="rId8"/>
+            </a:endParaRPr>
           </a:p>
           <a:p>
             <a:r>
               <a:rPr lang="en-US" sz="2000" dirty="0">
                 <a:hlinkClick r:id="rId9"/>
               </a:rPr>
-              <a:t>Debugging Rust in Visual Studio Code</a:t>
+              <a:t>Threads</a:t>
             </a:r>
             <a:endParaRPr lang="en-US" sz="2000" dirty="0"/>
           </a:p>
           <a:p>
             <a:r>
-              <a:rPr lang="en-US" sz="2000" dirty="0" err="1">
+              <a:rPr lang="en-US" sz="2000" dirty="0">
                 <a:hlinkClick r:id="rId10"/>
               </a:rPr>
+              <a:t>Debugging Rust in Visual Studio Code</a:t>
+            </a:r>
+            <a:endParaRPr lang="en-US" sz="2000" dirty="0"/>
+          </a:p>
+          <a:p>
+            <a:r>
+              <a:rPr lang="en-US" sz="2000" dirty="0" err="1">
+                <a:hlinkClick r:id="rId11"/>
+              </a:rPr>
               <a:t>RustBites</a:t>
             </a:r>
             <a:endParaRPr lang="en-US" sz="2000" dirty="0">
-              <a:hlinkClick r:id="rId11" action="ppaction://hlinkfile"/>
+              <a:hlinkClick r:id="rId12" action="ppaction://hlinkfile"/>
             </a:endParaRPr>
           </a:p>
           <a:p>

</xml_diff>